<commit_message>
fix: some small adjustments on everything
</commit_message>
<xml_diff>
--- a/Presentasjon_ML.pptx
+++ b/Presentasjon_ML.pptx
@@ -211,7 +211,7 @@
           <a:p>
             <a:fld id="{3CD0CE7B-105B-664E-9F80-728B06ECFBFE}" type="datetimeFigureOut">
               <a:rPr lang="nb-NO" smtClean="0"/>
-              <a:t>14.03.2024</a:t>
+              <a:t>18.03.2024</a:t>
             </a:fld>
             <a:endParaRPr lang="nb-NO"/>
           </a:p>
@@ -634,7 +634,7 @@
           <a:p>
             <a:fld id="{098A0168-EB40-45AF-89A1-87DE0A55FFC6}" type="datetime1">
               <a:rPr lang="en-US" smtClean="0"/>
-              <a:t>3/14/24</a:t>
+              <a:t>3/18/24</a:t>
             </a:fld>
             <a:endParaRPr lang="en-US"/>
           </a:p>
@@ -885,7 +885,7 @@
           <a:p>
             <a:fld id="{8F8CA68F-747D-436A-B5BB-2EBC3ED499E4}" type="datetime1">
               <a:rPr lang="en-US" smtClean="0"/>
-              <a:t>3/14/24</a:t>
+              <a:t>3/18/24</a:t>
             </a:fld>
             <a:endParaRPr lang="en-US"/>
           </a:p>
@@ -1095,7 +1095,7 @@
           <a:p>
             <a:fld id="{6DD8DC11-9E39-40A0-B3DC-E3F2AD04A616}" type="datetime1">
               <a:rPr lang="en-US" smtClean="0"/>
-              <a:t>3/14/24</a:t>
+              <a:t>3/18/24</a:t>
             </a:fld>
             <a:endParaRPr lang="en-US"/>
           </a:p>
@@ -1305,7 +1305,7 @@
           <a:p>
             <a:fld id="{BE0A88F0-556B-4BB7-8AAB-D63AEB65C662}" type="datetime1">
               <a:rPr lang="en-US" smtClean="0"/>
-              <a:t>3/14/24</a:t>
+              <a:t>3/18/24</a:t>
             </a:fld>
             <a:endParaRPr lang="en-US"/>
           </a:p>
@@ -1622,7 +1622,7 @@
           <a:p>
             <a:fld id="{60E05506-6815-4E0E-B1DE-ECA35C2016DF}" type="datetime1">
               <a:rPr lang="en-US" smtClean="0"/>
-              <a:t>3/14/24</a:t>
+              <a:t>3/18/24</a:t>
             </a:fld>
             <a:endParaRPr lang="en-US"/>
           </a:p>
@@ -1895,7 +1895,7 @@
           <a:p>
             <a:fld id="{FC6E85F7-A724-48A4-9D33-CEBC5174E865}" type="datetime1">
               <a:rPr lang="en-US" smtClean="0"/>
-              <a:t>3/14/24</a:t>
+              <a:t>3/18/24</a:t>
             </a:fld>
             <a:endParaRPr lang="en-US"/>
           </a:p>
@@ -2406,7 +2406,7 @@
           <a:p>
             <a:fld id="{42806E7A-BDD3-46A3-BEE2-EB821F9236B4}" type="datetime1">
               <a:rPr lang="en-US" smtClean="0"/>
-              <a:t>3/14/24</a:t>
+              <a:t>3/18/24</a:t>
             </a:fld>
             <a:endParaRPr lang="en-US"/>
           </a:p>
@@ -2639,7 +2639,7 @@
           <a:p>
             <a:fld id="{9ED1540C-9440-4E7A-B71A-BEFEE06869E3}" type="datetime1">
               <a:rPr lang="en-US" smtClean="0"/>
-              <a:t>3/14/24</a:t>
+              <a:t>3/18/24</a:t>
             </a:fld>
             <a:endParaRPr lang="en-US"/>
           </a:p>
@@ -2752,7 +2752,7 @@
           <a:p>
             <a:fld id="{E0318DDB-88AC-4039-B59C-B05DC4C9C16C}" type="datetime1">
               <a:rPr lang="en-US" smtClean="0"/>
-              <a:t>3/14/24</a:t>
+              <a:t>3/18/24</a:t>
             </a:fld>
             <a:endParaRPr lang="en-US"/>
           </a:p>
@@ -3067,7 +3067,7 @@
           <a:p>
             <a:fld id="{E082ABFB-60E7-4BA1-866A-7059F058065B}" type="datetime1">
               <a:rPr lang="en-US" smtClean="0"/>
-              <a:t>3/14/24</a:t>
+              <a:t>3/18/24</a:t>
             </a:fld>
             <a:endParaRPr lang="en-US"/>
           </a:p>
@@ -3359,7 +3359,7 @@
           <a:p>
             <a:fld id="{2694112F-55F4-4776-A323-7418930321C8}" type="datetime1">
               <a:rPr lang="en-US" smtClean="0"/>
-              <a:t>3/14/24</a:t>
+              <a:t>3/18/24</a:t>
             </a:fld>
             <a:endParaRPr lang="en-US"/>
           </a:p>
@@ -3654,7 +3654,7 @@
           <a:p>
             <a:fld id="{CFBEA57F-793F-4683-BD8A-741FD4B89154}" type="datetime1">
               <a:rPr lang="en-US" smtClean="0"/>
-              <a:t>3/14/24</a:t>
+              <a:t>3/18/24</a:t>
             </a:fld>
             <a:endParaRPr lang="en-US" dirty="0"/>
           </a:p>
@@ -4857,7 +4857,7 @@
           <a:p>
             <a:fld id="{BE0A88F0-556B-4BB7-8AAB-D63AEB65C662}" type="datetime1">
               <a:rPr lang="en-US" smtClean="0"/>
-              <a:t>3/14/24</a:t>
+              <a:t>3/18/24</a:t>
             </a:fld>
             <a:endParaRPr lang="en-US"/>
           </a:p>
@@ -5051,7 +5051,7 @@
           <a:p>
             <a:fld id="{BE0A88F0-556B-4BB7-8AAB-D63AEB65C662}" type="datetime1">
               <a:rPr lang="en-US" smtClean="0"/>
-              <a:t>3/14/24</a:t>
+              <a:t>3/18/24</a:t>
             </a:fld>
             <a:endParaRPr lang="en-US"/>
           </a:p>
@@ -5275,7 +5275,7 @@
           <a:p>
             <a:fld id="{BE0A88F0-556B-4BB7-8AAB-D63AEB65C662}" type="datetime1">
               <a:rPr lang="en-US" smtClean="0"/>
-              <a:t>3/14/24</a:t>
+              <a:t>3/18/24</a:t>
             </a:fld>
             <a:endParaRPr lang="en-US"/>
           </a:p>
@@ -5469,7 +5469,7 @@
           <a:p>
             <a:fld id="{BE0A88F0-556B-4BB7-8AAB-D63AEB65C662}" type="datetime1">
               <a:rPr lang="en-US" smtClean="0"/>
-              <a:t>3/14/24</a:t>
+              <a:t>3/18/24</a:t>
             </a:fld>
             <a:endParaRPr lang="en-US"/>
           </a:p>
@@ -5819,7 +5819,7 @@
           <a:p>
             <a:fld id="{BE0A88F0-556B-4BB7-8AAB-D63AEB65C662}" type="datetime1">
               <a:rPr lang="en-US" smtClean="0"/>
-              <a:t>3/14/24</a:t>
+              <a:t>3/18/24</a:t>
             </a:fld>
             <a:endParaRPr lang="en-US"/>
           </a:p>
@@ -6022,7 +6022,7 @@
           <a:p>
             <a:fld id="{BE0A88F0-556B-4BB7-8AAB-D63AEB65C662}" type="datetime1">
               <a:rPr lang="en-US" smtClean="0"/>
-              <a:t>3/14/24</a:t>
+              <a:t>3/18/24</a:t>
             </a:fld>
             <a:endParaRPr lang="en-US"/>
           </a:p>
@@ -6169,19 +6169,33 @@
           <a:p>
             <a:r>
               <a:rPr lang="nb-NO" dirty="0"/>
+              <a:t>Viktigheten rundt data og databehandling</a:t>
+            </a:r>
+          </a:p>
+          <a:p>
+            <a:r>
+              <a:rPr lang="nb-NO" dirty="0"/>
               <a:t>Forskjellige maskinlæringsalgoritmer </a:t>
             </a:r>
           </a:p>
           <a:p>
             <a:r>
               <a:rPr lang="nb-NO" dirty="0"/>
-              <a:t>Hvordan fungerer en maskinlæringsmodell</a:t>
+              <a:t>Hyperparametere </a:t>
             </a:r>
           </a:p>
           <a:p>
             <a:r>
               <a:rPr lang="nb-NO" dirty="0"/>
-              <a:t>Viktigheten rundt data og databehandling</a:t>
+              <a:t>Hvordan fungerer en maskinlæringsmodell – </a:t>
+            </a:r>
+            <a:r>
+              <a:rPr lang="nb-NO" dirty="0" err="1"/>
+              <a:t>Adaline</a:t>
+            </a:r>
+            <a:r>
+              <a:rPr lang="nb-NO" dirty="0"/>
+              <a:t> </a:t>
             </a:r>
           </a:p>
           <a:p>
@@ -6215,7 +6229,7 @@
           <a:p>
             <a:fld id="{BE0A88F0-556B-4BB7-8AAB-D63AEB65C662}" type="datetime1">
               <a:rPr lang="en-US" smtClean="0"/>
-              <a:t>3/14/24</a:t>
+              <a:t>3/18/24</a:t>
             </a:fld>
             <a:endParaRPr lang="en-US"/>
           </a:p>
@@ -6397,7 +6411,7 @@
           <a:p>
             <a:fld id="{BE0A88F0-556B-4BB7-8AAB-D63AEB65C662}" type="datetime1">
               <a:rPr lang="en-US" smtClean="0"/>
-              <a:t>3/14/24</a:t>
+              <a:t>3/18/24</a:t>
             </a:fld>
             <a:endParaRPr lang="en-US"/>
           </a:p>
@@ -6642,7 +6656,7 @@
           <a:p>
             <a:fld id="{BE0A88F0-556B-4BB7-8AAB-D63AEB65C662}" type="datetime1">
               <a:rPr lang="en-US" smtClean="0"/>
-              <a:t>3/14/24</a:t>
+              <a:t>3/18/24</a:t>
             </a:fld>
             <a:endParaRPr lang="en-US"/>
           </a:p>
@@ -6872,7 +6886,7 @@
           <a:p>
             <a:fld id="{BE0A88F0-556B-4BB7-8AAB-D63AEB65C662}" type="datetime1">
               <a:rPr lang="en-US" smtClean="0"/>
-              <a:t>3/14/24</a:t>
+              <a:t>3/18/24</a:t>
             </a:fld>
             <a:endParaRPr lang="en-US"/>
           </a:p>
@@ -7148,7 +7162,7 @@
           <a:p>
             <a:fld id="{BE0A88F0-556B-4BB7-8AAB-D63AEB65C662}" type="datetime1">
               <a:rPr lang="en-US" smtClean="0"/>
-              <a:t>3/14/24</a:t>
+              <a:t>3/18/24</a:t>
             </a:fld>
             <a:endParaRPr lang="en-US"/>
           </a:p>
@@ -7405,7 +7419,7 @@
           <a:p>
             <a:fld id="{BE0A88F0-556B-4BB7-8AAB-D63AEB65C662}" type="datetime1">
               <a:rPr lang="en-US" smtClean="0"/>
-              <a:t>3/14/24</a:t>
+              <a:t>3/18/24</a:t>
             </a:fld>
             <a:endParaRPr lang="en-US"/>
           </a:p>
@@ -7550,7 +7564,7 @@
           <a:p>
             <a:fld id="{BE0A88F0-556B-4BB7-8AAB-D63AEB65C662}" type="datetime1">
               <a:rPr lang="en-US" smtClean="0"/>
-              <a:t>3/14/24</a:t>
+              <a:t>3/18/24</a:t>
             </a:fld>
             <a:endParaRPr lang="en-US"/>
           </a:p>
@@ -7776,7 +7790,7 @@
           <a:p>
             <a:fld id="{BE0A88F0-556B-4BB7-8AAB-D63AEB65C662}" type="datetime1">
               <a:rPr lang="en-US" smtClean="0"/>
-              <a:t>3/14/24</a:t>
+              <a:t>3/18/24</a:t>
             </a:fld>
             <a:endParaRPr lang="en-US"/>
           </a:p>

</xml_diff>